<commit_message>
Another superbowl (2019) done!
</commit_message>
<xml_diff>
--- a/Fix Banner.pptx
+++ b/Fix Banner.pptx
@@ -104,6 +104,11 @@
       </a:defRPr>
     </a:lvl9pPr>
   </p:defaultTextStyle>
+  <p:extLst>
+    <p:ext uri="{EFAFB233-063F-42B5-8137-9DF3F51BA10A}">
+      <p15:sldGuideLst xmlns:p15="http://schemas.microsoft.com/office/powerpoint/2012/main"/>
+    </p:ext>
+  </p:extLst>
 </p:presentation>
 </file>
 
@@ -238,7 +243,7 @@
           <a:p>
             <a:fld id="{F6A25132-2F5E-4A31-BAF4-398441611941}" type="datetimeFigureOut">
               <a:rPr lang="en-US" smtClean="0"/>
-              <a:t>2/3/2018</a:t>
+              <a:t>1/26/2019</a:t>
             </a:fld>
             <a:endParaRPr lang="en-US"/>
           </a:p>
@@ -408,7 +413,7 @@
           <a:p>
             <a:fld id="{F6A25132-2F5E-4A31-BAF4-398441611941}" type="datetimeFigureOut">
               <a:rPr lang="en-US" smtClean="0"/>
-              <a:t>2/3/2018</a:t>
+              <a:t>1/26/2019</a:t>
             </a:fld>
             <a:endParaRPr lang="en-US"/>
           </a:p>
@@ -588,7 +593,7 @@
           <a:p>
             <a:fld id="{F6A25132-2F5E-4A31-BAF4-398441611941}" type="datetimeFigureOut">
               <a:rPr lang="en-US" smtClean="0"/>
-              <a:t>2/3/2018</a:t>
+              <a:t>1/26/2019</a:t>
             </a:fld>
             <a:endParaRPr lang="en-US"/>
           </a:p>
@@ -758,7 +763,7 @@
           <a:p>
             <a:fld id="{F6A25132-2F5E-4A31-BAF4-398441611941}" type="datetimeFigureOut">
               <a:rPr lang="en-US" smtClean="0"/>
-              <a:t>2/3/2018</a:t>
+              <a:t>1/26/2019</a:t>
             </a:fld>
             <a:endParaRPr lang="en-US"/>
           </a:p>
@@ -1002,7 +1007,7 @@
           <a:p>
             <a:fld id="{F6A25132-2F5E-4A31-BAF4-398441611941}" type="datetimeFigureOut">
               <a:rPr lang="en-US" smtClean="0"/>
-              <a:t>2/3/2018</a:t>
+              <a:t>1/26/2019</a:t>
             </a:fld>
             <a:endParaRPr lang="en-US"/>
           </a:p>
@@ -1234,7 +1239,7 @@
           <a:p>
             <a:fld id="{F6A25132-2F5E-4A31-BAF4-398441611941}" type="datetimeFigureOut">
               <a:rPr lang="en-US" smtClean="0"/>
-              <a:t>2/3/2018</a:t>
+              <a:t>1/26/2019</a:t>
             </a:fld>
             <a:endParaRPr lang="en-US"/>
           </a:p>
@@ -1601,7 +1606,7 @@
           <a:p>
             <a:fld id="{F6A25132-2F5E-4A31-BAF4-398441611941}" type="datetimeFigureOut">
               <a:rPr lang="en-US" smtClean="0"/>
-              <a:t>2/3/2018</a:t>
+              <a:t>1/26/2019</a:t>
             </a:fld>
             <a:endParaRPr lang="en-US"/>
           </a:p>
@@ -1719,7 +1724,7 @@
           <a:p>
             <a:fld id="{F6A25132-2F5E-4A31-BAF4-398441611941}" type="datetimeFigureOut">
               <a:rPr lang="en-US" smtClean="0"/>
-              <a:t>2/3/2018</a:t>
+              <a:t>1/26/2019</a:t>
             </a:fld>
             <a:endParaRPr lang="en-US"/>
           </a:p>
@@ -1814,7 +1819,7 @@
           <a:p>
             <a:fld id="{F6A25132-2F5E-4A31-BAF4-398441611941}" type="datetimeFigureOut">
               <a:rPr lang="en-US" smtClean="0"/>
-              <a:t>2/3/2018</a:t>
+              <a:t>1/26/2019</a:t>
             </a:fld>
             <a:endParaRPr lang="en-US"/>
           </a:p>
@@ -2091,7 +2096,7 @@
           <a:p>
             <a:fld id="{F6A25132-2F5E-4A31-BAF4-398441611941}" type="datetimeFigureOut">
               <a:rPr lang="en-US" smtClean="0"/>
-              <a:t>2/3/2018</a:t>
+              <a:t>1/26/2019</a:t>
             </a:fld>
             <a:endParaRPr lang="en-US"/>
           </a:p>
@@ -2348,7 +2353,7 @@
           <a:p>
             <a:fld id="{F6A25132-2F5E-4A31-BAF4-398441611941}" type="datetimeFigureOut">
               <a:rPr lang="en-US" smtClean="0"/>
-              <a:t>2/3/2018</a:t>
+              <a:t>1/26/2019</a:t>
             </a:fld>
             <a:endParaRPr lang="en-US"/>
           </a:p>
@@ -2561,7 +2566,7 @@
           <a:p>
             <a:fld id="{F6A25132-2F5E-4A31-BAF4-398441611941}" type="datetimeFigureOut">
               <a:rPr lang="en-US" smtClean="0"/>
-              <a:t>2/3/2018</a:t>
+              <a:t>1/26/2019</a:t>
             </a:fld>
             <a:endParaRPr lang="en-US"/>
           </a:p>
@@ -3017,10 +3022,10 @@
       </p:sp>
       <p:pic>
         <p:nvPicPr>
-          <p:cNvPr id="1028" name="Picture 4" descr="Related image">
+          <p:cNvPr id="1026" name="Picture 2" descr="Image result for super bowl 2019">
             <a:extLst>
               <a:ext uri="{FF2B5EF4-FFF2-40B4-BE49-F238E27FC236}">
-                <a16:creationId xmlns:a16="http://schemas.microsoft.com/office/drawing/2014/main" id="{580C4354-B748-4492-9443-1BFDD5D229C1}"/>
+                <a16:creationId xmlns:a16="http://schemas.microsoft.com/office/drawing/2014/main" id="{BF455E4A-9933-4CCA-AA4E-820E4D176FFD}"/>
               </a:ext>
             </a:extLst>
           </p:cNvPr>
@@ -3044,15 +3049,22 @@
         </p:blipFill>
         <p:spPr bwMode="auto">
           <a:xfrm>
-            <a:off x="239718" y="1839687"/>
-            <a:ext cx="7260255" cy="4833256"/>
+            <a:off x="0" y="1927225"/>
+            <a:ext cx="7772400" cy="4373563"/>
           </a:xfrm>
           <a:prstGeom prst="rect">
             <a:avLst/>
           </a:prstGeom>
-          <a:solidFill>
-            <a:srgbClr val="0E2138"/>
-          </a:solidFill>
+          <a:noFill/>
+          <a:extLst>
+            <a:ext uri="{909E8E84-426E-40DD-AFC4-6F175D3DCCD1}">
+              <a14:hiddenFill xmlns:a14="http://schemas.microsoft.com/office/drawing/2010/main">
+                <a:solidFill>
+                  <a:srgbClr val="FFFFFF"/>
+                </a:solidFill>
+              </a14:hiddenFill>
+            </a:ext>
+          </a:extLst>
         </p:spPr>
       </p:pic>
     </p:spTree>

</xml_diff>